<commit_message>
third commit to test ppt
</commit_message>
<xml_diff>
--- a/DSE/blot en test fil ifbm github.pptx
+++ b/DSE/blot en test fil ifbm github.pptx
@@ -7,6 +7,7 @@
   <p:sldIdLst>
     <p:sldId id="256" r:id="rId2"/>
     <p:sldId id="257" r:id="rId3"/>
+    <p:sldId id="258" r:id="rId4"/>
   </p:sldIdLst>
   <p:sldSz cx="12192000" cy="6858000"/>
   <p:notesSz cx="6858000" cy="9144000"/>
@@ -3086,11 +3087,7 @@
             </a:r>
             <a:r>
               <a:rPr lang="da-DK" dirty="0" smtClean="0"/>
-              <a:t>. </a:t>
-            </a:r>
-            <a:r>
-              <a:rPr lang="da-DK" dirty="0" smtClean="0"/>
-              <a:t>commit</a:t>
+              <a:t>. commit</a:t>
             </a:r>
             <a:endParaRPr lang="da-DK" dirty="0"/>
           </a:p>
@@ -3100,6 +3097,88 @@
     <p:extLst>
       <p:ext uri="{BB962C8B-B14F-4D97-AF65-F5344CB8AC3E}">
         <p14:creationId xmlns:p14="http://schemas.microsoft.com/office/powerpoint/2010/main" val="988724039"/>
+      </p:ext>
+    </p:extLst>
+  </p:cSld>
+  <p:clrMapOvr>
+    <a:masterClrMapping/>
+  </p:clrMapOvr>
+</p:sld>
+</file>
+
+<file path=ppt/slides/slide3.xml><?xml version="1.0" encoding="utf-8"?>
+<p:sld xmlns:a="http://schemas.openxmlformats.org/drawingml/2006/main" xmlns:r="http://schemas.openxmlformats.org/officeDocument/2006/relationships" xmlns:p="http://schemas.openxmlformats.org/presentationml/2006/main">
+  <p:cSld>
+    <p:spTree>
+      <p:nvGrpSpPr>
+        <p:cNvPr id="1" name=""/>
+        <p:cNvGrpSpPr/>
+        <p:nvPr/>
+      </p:nvGrpSpPr>
+      <p:grpSpPr>
+        <a:xfrm>
+          <a:off x="0" y="0"/>
+          <a:ext cx="0" cy="0"/>
+          <a:chOff x="0" y="0"/>
+          <a:chExt cx="0" cy="0"/>
+        </a:xfrm>
+      </p:grpSpPr>
+      <p:sp>
+        <p:nvSpPr>
+          <p:cNvPr id="2" name="Rectangle 1"/>
+          <p:cNvSpPr/>
+          <p:nvPr/>
+        </p:nvSpPr>
+        <p:spPr>
+          <a:xfrm>
+            <a:off x="1358537" y="566057"/>
+            <a:ext cx="2586446" cy="1236617"/>
+          </a:xfrm>
+          <a:prstGeom prst="rect">
+            <a:avLst/>
+          </a:prstGeom>
+        </p:spPr>
+        <p:style>
+          <a:lnRef idx="2">
+            <a:schemeClr val="accent1">
+              <a:shade val="50000"/>
+            </a:schemeClr>
+          </a:lnRef>
+          <a:fillRef idx="1">
+            <a:schemeClr val="accent1"/>
+          </a:fillRef>
+          <a:effectRef idx="0">
+            <a:schemeClr val="accent1"/>
+          </a:effectRef>
+          <a:fontRef idx="minor">
+            <a:schemeClr val="lt1"/>
+          </a:fontRef>
+        </p:style>
+        <p:txBody>
+          <a:bodyPr rtlCol="0" anchor="ctr"/>
+          <a:lstStyle/>
+          <a:p>
+            <a:pPr algn="ctr"/>
+            <a:r>
+              <a:rPr lang="da-DK" dirty="0"/>
+              <a:t>3</a:t>
+            </a:r>
+            <a:r>
+              <a:rPr lang="da-DK" dirty="0" smtClean="0"/>
+              <a:t>. </a:t>
+            </a:r>
+            <a:r>
+              <a:rPr lang="da-DK" dirty="0" smtClean="0"/>
+              <a:t>commit</a:t>
+            </a:r>
+            <a:endParaRPr lang="da-DK" dirty="0"/>
+          </a:p>
+        </p:txBody>
+      </p:sp>
+    </p:spTree>
+    <p:extLst>
+      <p:ext uri="{BB962C8B-B14F-4D97-AF65-F5344CB8AC3E}">
+        <p14:creationId xmlns:p14="http://schemas.microsoft.com/office/powerpoint/2010/main" val="3030166371"/>
       </p:ext>
     </p:extLst>
   </p:cSld>

</xml_diff>